<commit_message>
materials for messy data
</commit_message>
<xml_diff>
--- a/Workshop_Materials/Workshop_10-Long_and_Wide_Data.pptx
+++ b/Workshop_Materials/Workshop_10-Long_and_Wide_Data.pptx
@@ -209,7 +209,7 @@
           <a:p>
             <a:fld id="{88D402AD-7ADB-D541-A58A-382EB9179170}" type="datetimeFigureOut">
               <a:rPr lang="en-US" smtClean="0"/>
-              <a:t>10/24/17</a:t>
+              <a:t>11/29/17</a:t>
             </a:fld>
             <a:endParaRPr lang="en-US"/>
           </a:p>
@@ -742,7 +742,7 @@
           <a:p>
             <a:fld id="{AF5CBEF6-4E17-CF46-AF64-B072BA4F854A}" type="datetimeFigureOut">
               <a:rPr lang="en-US" smtClean="0"/>
-              <a:t>10/24/17</a:t>
+              <a:t>11/29/17</a:t>
             </a:fld>
             <a:endParaRPr lang="en-US"/>
           </a:p>
@@ -912,7 +912,7 @@
           <a:p>
             <a:fld id="{AF5CBEF6-4E17-CF46-AF64-B072BA4F854A}" type="datetimeFigureOut">
               <a:rPr lang="en-US" smtClean="0"/>
-              <a:t>10/24/17</a:t>
+              <a:t>11/29/17</a:t>
             </a:fld>
             <a:endParaRPr lang="en-US"/>
           </a:p>
@@ -1158,7 +1158,7 @@
           <a:p>
             <a:fld id="{AF5CBEF6-4E17-CF46-AF64-B072BA4F854A}" type="datetimeFigureOut">
               <a:rPr lang="en-US" smtClean="0"/>
-              <a:t>10/24/17</a:t>
+              <a:t>11/29/17</a:t>
             </a:fld>
             <a:endParaRPr lang="en-US"/>
           </a:p>
@@ -1446,7 +1446,7 @@
           <a:p>
             <a:fld id="{AF5CBEF6-4E17-CF46-AF64-B072BA4F854A}" type="datetimeFigureOut">
               <a:rPr lang="en-US" smtClean="0"/>
-              <a:t>10/24/17</a:t>
+              <a:t>11/29/17</a:t>
             </a:fld>
             <a:endParaRPr lang="en-US"/>
           </a:p>
@@ -1868,7 +1868,7 @@
           <a:p>
             <a:fld id="{AF5CBEF6-4E17-CF46-AF64-B072BA4F854A}" type="datetimeFigureOut">
               <a:rPr lang="en-US" smtClean="0"/>
-              <a:t>10/24/17</a:t>
+              <a:t>11/29/17</a:t>
             </a:fld>
             <a:endParaRPr lang="en-US"/>
           </a:p>
@@ -1986,7 +1986,7 @@
           <a:p>
             <a:fld id="{AF5CBEF6-4E17-CF46-AF64-B072BA4F854A}" type="datetimeFigureOut">
               <a:rPr lang="en-US" smtClean="0"/>
-              <a:t>10/24/17</a:t>
+              <a:t>11/29/17</a:t>
             </a:fld>
             <a:endParaRPr lang="en-US"/>
           </a:p>
@@ -2081,7 +2081,7 @@
           <a:p>
             <a:fld id="{AF5CBEF6-4E17-CF46-AF64-B072BA4F854A}" type="datetimeFigureOut">
               <a:rPr lang="en-US" smtClean="0"/>
-              <a:t>10/24/17</a:t>
+              <a:t>11/29/17</a:t>
             </a:fld>
             <a:endParaRPr lang="en-US"/>
           </a:p>
@@ -2334,7 +2334,7 @@
           <a:p>
             <a:fld id="{AF5CBEF6-4E17-CF46-AF64-B072BA4F854A}" type="datetimeFigureOut">
               <a:rPr lang="en-US" smtClean="0"/>
-              <a:t>10/24/17</a:t>
+              <a:t>11/29/17</a:t>
             </a:fld>
             <a:endParaRPr lang="en-US"/>
           </a:p>
@@ -2547,7 +2547,7 @@
           <a:p>
             <a:fld id="{AF5CBEF6-4E17-CF46-AF64-B072BA4F854A}" type="datetimeFigureOut">
               <a:rPr lang="en-US" smtClean="0"/>
-              <a:t>10/24/17</a:t>
+              <a:t>11/29/17</a:t>
             </a:fld>
             <a:endParaRPr lang="en-US"/>
           </a:p>
@@ -2943,7 +2943,7 @@
           <a:p>
             <a:r>
               <a:rPr lang="en-US" sz="4000" dirty="0" smtClean="0"/>
-              <a:t>Functions</a:t>
+              <a:t>Long and Wide Data</a:t>
             </a:r>
             <a:endParaRPr lang="en-US" sz="4000" dirty="0"/>
           </a:p>
@@ -2980,7 +2980,7 @@
                   <a:srgbClr val="999999"/>
                 </a:solidFill>
               </a:rPr>
-              <a:t>Reusing Code.</a:t>
+              <a:t>Transforming between two formats.</a:t>
             </a:r>
             <a:endParaRPr lang="en-US" sz="2800" dirty="0" smtClean="0">
               <a:solidFill>
@@ -2998,7 +2998,7 @@
                   <a:srgbClr val="999999"/>
                 </a:solidFill>
               </a:rPr>
-              <a:t>Generalization.</a:t>
+              <a:t>One row per individual.</a:t>
             </a:r>
             <a:endParaRPr lang="en-US" sz="2800" dirty="0" smtClean="0">
               <a:solidFill>
@@ -3016,39 +3016,8 @@
                   <a:srgbClr val="999999"/>
                 </a:solidFill>
               </a:rPr>
-              <a:t>Breaking up Functionality.</a:t>
-            </a:r>
-          </a:p>
-          <a:p>
-            <a:pPr marL="514350" indent="-514350" algn="l">
-              <a:buAutoNum type="arabicPeriod"/>
-            </a:pPr>
-            <a:r>
-              <a:rPr lang="en-US" sz="2800" dirty="0" smtClean="0">
-                <a:solidFill>
-                  <a:srgbClr val="999999"/>
-                </a:solidFill>
-              </a:rPr>
-              <a:t>Precursor to </a:t>
-            </a:r>
-            <a:r>
-              <a:rPr lang="en-US" sz="2800" smtClean="0">
-                <a:solidFill>
-                  <a:srgbClr val="999999"/>
-                </a:solidFill>
-              </a:rPr>
-              <a:t>R package.</a:t>
-            </a:r>
-            <a:endParaRPr lang="en-US" sz="2800" dirty="0" smtClean="0">
-              <a:solidFill>
-                <a:srgbClr val="999999"/>
-              </a:solidFill>
-            </a:endParaRPr>
-          </a:p>
-          <a:p>
-            <a:pPr marL="514350" indent="-514350" algn="l">
-              <a:buAutoNum type="arabicPeriod"/>
-            </a:pPr>
+              <a:t>One row per individual X time .</a:t>
+            </a:r>
             <a:endParaRPr lang="en-US" sz="2800" dirty="0" smtClean="0">
               <a:solidFill>
                 <a:srgbClr val="999999"/>
@@ -3064,6 +3033,58 @@
                 <a:srgbClr val="999999"/>
               </a:solidFill>
             </a:endParaRPr>
+          </a:p>
+        </p:txBody>
+      </p:sp>
+      <p:sp>
+        <p:nvSpPr>
+          <p:cNvPr id="4" name="TextBox 3"/>
+          <p:cNvSpPr txBox="1"/>
+          <p:nvPr/>
+        </p:nvSpPr>
+        <p:spPr>
+          <a:xfrm>
+            <a:off x="3108960" y="1727200"/>
+            <a:ext cx="184731" cy="369332"/>
+          </a:xfrm>
+          <a:prstGeom prst="rect">
+            <a:avLst/>
+          </a:prstGeom>
+          <a:noFill/>
+        </p:spPr>
+        <p:txBody>
+          <a:bodyPr wrap="none" rtlCol="0">
+            <a:spAutoFit/>
+          </a:bodyPr>
+          <a:lstStyle/>
+          <a:p>
+            <a:endParaRPr lang="en-US" dirty="0"/>
+          </a:p>
+        </p:txBody>
+      </p:sp>
+      <p:sp>
+        <p:nvSpPr>
+          <p:cNvPr id="5" name="TextBox 4"/>
+          <p:cNvSpPr txBox="1"/>
+          <p:nvPr/>
+        </p:nvSpPr>
+        <p:spPr>
+          <a:xfrm>
+            <a:off x="8092440" y="685800"/>
+            <a:ext cx="184731" cy="369332"/>
+          </a:xfrm>
+          <a:prstGeom prst="rect">
+            <a:avLst/>
+          </a:prstGeom>
+          <a:noFill/>
+        </p:spPr>
+        <p:txBody>
+          <a:bodyPr wrap="none" rtlCol="0">
+            <a:spAutoFit/>
+          </a:bodyPr>
+          <a:lstStyle/>
+          <a:p>
+            <a:endParaRPr lang="en-US"/>
           </a:p>
         </p:txBody>
       </p:sp>

</xml_diff>